<commit_message>
add ssh connection to slide
</commit_message>
<xml_diff>
--- a/docs/VTM_Photo_rehoot_Falk.pptx
+++ b/docs/VTM_Photo_rehoot_Falk.pptx
@@ -4952,7 +4952,7 @@
         <p:spPr>
           <a:xfrm>
             <a:off x="1066800" y="1600200"/>
-            <a:ext cx="7315200" cy="1569660"/>
+            <a:ext cx="7315200" cy="2308324"/>
           </a:xfrm>
           <a:prstGeom prst="rect">
             <a:avLst/>
@@ -5012,6 +5012,44 @@
             <a:r>
               <a:rPr lang="en-US" sz="2400" dirty="0" err="1" smtClean="0"/>
               <a:t>hackathon</a:t>
+            </a:r>
+            <a:endParaRPr lang="en-US" sz="2400" dirty="0" smtClean="0"/>
+          </a:p>
+          <a:p>
+            <a:pPr marL="285750" indent="-285750">
+              <a:buFontTx/>
+              <a:buChar char="-"/>
+            </a:pPr>
+            <a:endParaRPr lang="en-US" sz="2400" dirty="0"/>
+          </a:p>
+          <a:p>
+            <a:r>
+              <a:rPr lang="en-US" sz="2400" dirty="0" smtClean="0"/>
+              <a:t>(</a:t>
+            </a:r>
+            <a:r>
+              <a:rPr lang="en-US" sz="2400" dirty="0" err="1" smtClean="0"/>
+              <a:t>ssh</a:t>
+            </a:r>
+            <a:r>
+              <a:rPr lang="en-US" sz="2400" dirty="0"/>
+              <a:t>: </a:t>
+            </a:r>
+            <a:r>
+              <a:rPr lang="en-US" sz="2400" dirty="0" err="1" smtClean="0"/>
+              <a:t>git@github.com:berkeley-gif</a:t>
+            </a:r>
+            <a:r>
+              <a:rPr lang="en-US" sz="2400" dirty="0" smtClean="0"/>
+              <a:t>/</a:t>
+            </a:r>
+            <a:r>
+              <a:rPr lang="en-US" sz="2400" dirty="0" err="1" smtClean="0"/>
+              <a:t>reshoot.git</a:t>
+            </a:r>
+            <a:r>
+              <a:rPr lang="en-US" sz="2400" smtClean="0"/>
+              <a:t>) </a:t>
             </a:r>
             <a:endParaRPr lang="en-US" sz="2400" dirty="0" smtClean="0"/>
           </a:p>
@@ -5734,7 +5772,7 @@
               <a:t>GeoJSON</a:t>
             </a:r>
             <a:r>
-              <a:rPr lang="en-US" sz="2800" b="1" smtClean="0">
+              <a:rPr lang="en-US" sz="2800" b="1" dirty="0" smtClean="0">
                 <a:solidFill>
                   <a:srgbClr val="003262"/>
                 </a:solidFill>

</xml_diff>